<commit_message>
Slides on cross-compilation of sourcecode for raspberry pi
</commit_message>
<xml_diff>
--- a/slides/raspberry_pi_2_crosscompilation.pptx
+++ b/slides/raspberry_pi_2_crosscompilation.pptx
@@ -17,10 +17,8 @@
     <p:sldId id="271" r:id="rId11"/>
     <p:sldId id="272" r:id="rId12"/>
     <p:sldId id="274" r:id="rId13"/>
-    <p:sldId id="275" r:id="rId14"/>
-    <p:sldId id="278" r:id="rId15"/>
-    <p:sldId id="279" r:id="rId16"/>
-    <p:sldId id="277" r:id="rId17"/>
+    <p:sldId id="287" r:id="rId14"/>
+    <p:sldId id="279" r:id="rId15"/>
   </p:sldIdLst>
   <p:sldSz cx="9144000" cy="6858000" type="screen4x3"/>
   <p:notesSz cx="6858000" cy="9144000"/>
@@ -328,7 +326,7 @@
           <a:p>
             <a:fld id="{9E1E4C47-8EB7-495D-938E-E2CDA69D1F3B}" type="datetimeFigureOut">
               <a:rPr lang="en-US" smtClean="0"/>
-              <a:t>9/27/2015</a:t>
+              <a:t>9/28/2015</a:t>
             </a:fld>
             <a:endParaRPr lang="en-US"/>
           </a:p>
@@ -467,7 +465,7 @@
           <a:p>
             <a:fld id="{9E1E4C47-8EB7-495D-938E-E2CDA69D1F3B}" type="datetimeFigureOut">
               <a:rPr lang="en-US" smtClean="0"/>
-              <a:t>9/27/2015</a:t>
+              <a:t>9/28/2015</a:t>
             </a:fld>
             <a:endParaRPr lang="en-US"/>
           </a:p>
@@ -583,7 +581,7 @@
           <a:p>
             <a:fld id="{9E1E4C47-8EB7-495D-938E-E2CDA69D1F3B}" type="datetimeFigureOut">
               <a:rPr lang="en-US" smtClean="0"/>
-              <a:t>9/27/2015</a:t>
+              <a:t>9/28/2015</a:t>
             </a:fld>
             <a:endParaRPr lang="en-US"/>
           </a:p>
@@ -881,7 +879,7 @@
           <a:p>
             <a:fld id="{9E1E4C47-8EB7-495D-938E-E2CDA69D1F3B}" type="datetimeFigureOut">
               <a:rPr lang="en-US" smtClean="0"/>
-              <a:t>9/27/2015</a:t>
+              <a:t>9/28/2015</a:t>
             </a:fld>
             <a:endParaRPr lang="en-US"/>
           </a:p>
@@ -1159,7 +1157,7 @@
           <a:p>
             <a:fld id="{9E1E4C47-8EB7-495D-938E-E2CDA69D1F3B}" type="datetimeFigureOut">
               <a:rPr lang="en-US" smtClean="0"/>
-              <a:t>9/27/2015</a:t>
+              <a:t>9/28/2015</a:t>
             </a:fld>
             <a:endParaRPr lang="en-US"/>
           </a:p>
@@ -1350,7 +1348,7 @@
           <a:p>
             <a:fld id="{9E1E4C47-8EB7-495D-938E-E2CDA69D1F3B}" type="datetimeFigureOut">
               <a:rPr lang="en-US" smtClean="0"/>
-              <a:t>9/27/2015</a:t>
+              <a:t>9/28/2015</a:t>
             </a:fld>
             <a:endParaRPr lang="en-US"/>
           </a:p>
@@ -1551,7 +1549,7 @@
           <a:p>
             <a:fld id="{9E1E4C47-8EB7-495D-938E-E2CDA69D1F3B}" type="datetimeFigureOut">
               <a:rPr lang="en-US" smtClean="0"/>
-              <a:t>9/27/2015</a:t>
+              <a:t>9/28/2015</a:t>
             </a:fld>
             <a:endParaRPr lang="en-US"/>
           </a:p>
@@ -1814,7 +1812,7 @@
           <a:p>
             <a:fld id="{9E1E4C47-8EB7-495D-938E-E2CDA69D1F3B}" type="datetimeFigureOut">
               <a:rPr lang="en-US" smtClean="0"/>
-              <a:t>9/27/2015</a:t>
+              <a:t>9/28/2015</a:t>
             </a:fld>
             <a:endParaRPr lang="en-US"/>
           </a:p>
@@ -2005,7 +2003,7 @@
           <a:p>
             <a:fld id="{9E1E4C47-8EB7-495D-938E-E2CDA69D1F3B}" type="datetimeFigureOut">
               <a:rPr lang="en-US" smtClean="0"/>
-              <a:t>9/27/2015</a:t>
+              <a:t>9/28/2015</a:t>
             </a:fld>
             <a:endParaRPr lang="en-US"/>
           </a:p>
@@ -2201,7 +2199,7 @@
           <a:p>
             <a:fld id="{9E1E4C47-8EB7-495D-938E-E2CDA69D1F3B}" type="datetimeFigureOut">
               <a:rPr lang="en-US" smtClean="0"/>
-              <a:t>9/27/2015</a:t>
+              <a:t>9/28/2015</a:t>
             </a:fld>
             <a:endParaRPr lang="en-US"/>
           </a:p>
@@ -2400,7 +2398,7 @@
           <a:p>
             <a:fld id="{9E1E4C47-8EB7-495D-938E-E2CDA69D1F3B}" type="datetimeFigureOut">
               <a:rPr lang="en-US" smtClean="0"/>
-              <a:t>9/27/2015</a:t>
+              <a:t>9/28/2015</a:t>
             </a:fld>
             <a:endParaRPr lang="en-US"/>
           </a:p>
@@ -2591,7 +2589,7 @@
           <a:p>
             <a:fld id="{9E1E4C47-8EB7-495D-938E-E2CDA69D1F3B}" type="datetimeFigureOut">
               <a:rPr lang="en-US" smtClean="0"/>
-              <a:t>9/27/2015</a:t>
+              <a:t>9/28/2015</a:t>
             </a:fld>
             <a:endParaRPr lang="en-US"/>
           </a:p>
@@ -2858,7 +2856,7 @@
           <a:p>
             <a:fld id="{9E1E4C47-8EB7-495D-938E-E2CDA69D1F3B}" type="datetimeFigureOut">
               <a:rPr lang="en-US" smtClean="0"/>
-              <a:t>9/27/2015</a:t>
+              <a:t>9/28/2015</a:t>
             </a:fld>
             <a:endParaRPr lang="en-US"/>
           </a:p>
@@ -3167,7 +3165,7 @@
           <a:p>
             <a:fld id="{9E1E4C47-8EB7-495D-938E-E2CDA69D1F3B}" type="datetimeFigureOut">
               <a:rPr lang="en-US" smtClean="0"/>
-              <a:t>9/27/2015</a:t>
+              <a:t>9/28/2015</a:t>
             </a:fld>
             <a:endParaRPr lang="en-US"/>
           </a:p>
@@ -3610,7 +3608,7 @@
           <a:p>
             <a:fld id="{9E1E4C47-8EB7-495D-938E-E2CDA69D1F3B}" type="datetimeFigureOut">
               <a:rPr lang="en-US" smtClean="0"/>
-              <a:t>9/27/2015</a:t>
+              <a:t>9/28/2015</a:t>
             </a:fld>
             <a:endParaRPr lang="en-US"/>
           </a:p>
@@ -3867,7 +3865,7 @@
           <a:p>
             <a:fld id="{9E1E4C47-8EB7-495D-938E-E2CDA69D1F3B}" type="datetimeFigureOut">
               <a:rPr lang="en-US" smtClean="0"/>
-              <a:t>9/27/2015</a:t>
+              <a:t>9/28/2015</a:t>
             </a:fld>
             <a:endParaRPr lang="en-US"/>
           </a:p>
@@ -4637,10 +4635,18 @@
                 <a:latin typeface="Consolas" panose="020B0609020204030204" pitchFamily="49" charset="0"/>
                 <a:cs typeface="Consolas" panose="020B0609020204030204" pitchFamily="49" charset="0"/>
               </a:rPr>
-              <a:t>CC=g++</a:t>
-            </a:r>
-          </a:p>
-          <a:p>
+              <a:t>CC=</a:t>
+            </a:r>
+            <a:r>
+              <a:rPr lang="en-US" sz="1200" dirty="0" err="1">
+                <a:solidFill>
+                  <a:srgbClr val="7030A0"/>
+                </a:solidFill>
+                <a:latin typeface="Consolas" panose="020B0609020204030204" pitchFamily="49" charset="0"/>
+                <a:cs typeface="Consolas" panose="020B0609020204030204" pitchFamily="49" charset="0"/>
+              </a:rPr>
+              <a:t>gcc</a:t>
+            </a:r>
             <a:endParaRPr lang="en-US" sz="1200" dirty="0">
               <a:solidFill>
                 <a:srgbClr val="7030A0"/>
@@ -4650,42 +4656,6 @@
             </a:endParaRPr>
           </a:p>
           <a:p>
-            <a:r>
-              <a:rPr lang="en-US" sz="1200" dirty="0">
-                <a:solidFill>
-                  <a:srgbClr val="7030A0"/>
-                </a:solidFill>
-                <a:latin typeface="Consolas" panose="020B0609020204030204" pitchFamily="49" charset="0"/>
-                <a:cs typeface="Consolas" panose="020B0609020204030204" pitchFamily="49" charset="0"/>
-              </a:rPr>
-              <a:t># Compiler flags</a:t>
-            </a:r>
-          </a:p>
-          <a:p>
-            <a:r>
-              <a:rPr lang="en-US" sz="1200" dirty="0">
-                <a:solidFill>
-                  <a:srgbClr val="7030A0"/>
-                </a:solidFill>
-                <a:latin typeface="Consolas" panose="020B0609020204030204" pitchFamily="49" charset="0"/>
-                <a:cs typeface="Consolas" panose="020B0609020204030204" pitchFamily="49" charset="0"/>
-              </a:rPr>
-              <a:t>CFLAGS  = -Wall</a:t>
-            </a:r>
-          </a:p>
-          <a:p>
-            <a:r>
-              <a:rPr lang="en-US" sz="1200" dirty="0">
-                <a:solidFill>
-                  <a:srgbClr val="7030A0"/>
-                </a:solidFill>
-                <a:latin typeface="Consolas" panose="020B0609020204030204" pitchFamily="49" charset="0"/>
-                <a:cs typeface="Consolas" panose="020B0609020204030204" pitchFamily="49" charset="0"/>
-              </a:rPr>
-              <a:t>  #  -Wall turns on most, but not all, compiler warnings</a:t>
-            </a:r>
-          </a:p>
-          <a:p>
             <a:endParaRPr lang="en-US" sz="1200" dirty="0">
               <a:solidFill>
                 <a:srgbClr val="7030A0"/>
@@ -4695,6 +4665,42 @@
             </a:endParaRPr>
           </a:p>
           <a:p>
+            <a:r>
+              <a:rPr lang="en-US" sz="1200" dirty="0">
+                <a:solidFill>
+                  <a:srgbClr val="7030A0"/>
+                </a:solidFill>
+                <a:latin typeface="Consolas" panose="020B0609020204030204" pitchFamily="49" charset="0"/>
+                <a:cs typeface="Consolas" panose="020B0609020204030204" pitchFamily="49" charset="0"/>
+              </a:rPr>
+              <a:t># Compiler flags</a:t>
+            </a:r>
+          </a:p>
+          <a:p>
+            <a:r>
+              <a:rPr lang="en-US" sz="1200" dirty="0">
+                <a:solidFill>
+                  <a:srgbClr val="7030A0"/>
+                </a:solidFill>
+                <a:latin typeface="Consolas" panose="020B0609020204030204" pitchFamily="49" charset="0"/>
+                <a:cs typeface="Consolas" panose="020B0609020204030204" pitchFamily="49" charset="0"/>
+              </a:rPr>
+              <a:t>CFLAGS=-Wall</a:t>
+            </a:r>
+          </a:p>
+          <a:p>
+            <a:r>
+              <a:rPr lang="en-US" sz="1200" dirty="0">
+                <a:solidFill>
+                  <a:srgbClr val="7030A0"/>
+                </a:solidFill>
+                <a:latin typeface="Consolas" panose="020B0609020204030204" pitchFamily="49" charset="0"/>
+                <a:cs typeface="Consolas" panose="020B0609020204030204" pitchFamily="49" charset="0"/>
+              </a:rPr>
+              <a:t>  #  -Wall turns on most, but not all, compiler warnings</a:t>
+            </a:r>
+          </a:p>
+          <a:p>
             <a:endParaRPr lang="en-US" sz="1200" dirty="0">
               <a:solidFill>
                 <a:srgbClr val="7030A0"/>
@@ -4704,30 +4710,6 @@
             </a:endParaRPr>
           </a:p>
           <a:p>
-            <a:r>
-              <a:rPr lang="en-US" sz="1200" dirty="0">
-                <a:solidFill>
-                  <a:srgbClr val="7030A0"/>
-                </a:solidFill>
-                <a:latin typeface="Consolas" panose="020B0609020204030204" pitchFamily="49" charset="0"/>
-                <a:cs typeface="Consolas" panose="020B0609020204030204" pitchFamily="49" charset="0"/>
-              </a:rPr>
-              <a:t>hello: clean</a:t>
-            </a:r>
-          </a:p>
-          <a:p>
-            <a:r>
-              <a:rPr lang="en-US" sz="1200" dirty="0">
-                <a:solidFill>
-                  <a:srgbClr val="7030A0"/>
-                </a:solidFill>
-                <a:latin typeface="Consolas" panose="020B0609020204030204" pitchFamily="49" charset="0"/>
-                <a:cs typeface="Consolas" panose="020B0609020204030204" pitchFamily="49" charset="0"/>
-              </a:rPr>
-              <a:t>	$(CC) $(CFLAGS) -o hello main.cpp</a:t>
-            </a:r>
-          </a:p>
-          <a:p>
             <a:endParaRPr lang="en-US" sz="1200" dirty="0">
               <a:solidFill>
                 <a:srgbClr val="7030A0"/>
@@ -4745,7 +4727,7 @@
                 <a:latin typeface="Consolas" panose="020B0609020204030204" pitchFamily="49" charset="0"/>
                 <a:cs typeface="Consolas" panose="020B0609020204030204" pitchFamily="49" charset="0"/>
               </a:rPr>
-              <a:t>clean:</a:t>
+              <a:t>hello: clean</a:t>
             </a:r>
           </a:p>
           <a:p>
@@ -4757,18 +4739,31 @@
                 <a:latin typeface="Consolas" panose="020B0609020204030204" pitchFamily="49" charset="0"/>
                 <a:cs typeface="Consolas" panose="020B0609020204030204" pitchFamily="49" charset="0"/>
               </a:rPr>
-              <a:t>	</a:t>
-            </a:r>
-            <a:r>
-              <a:rPr lang="en-US" sz="1200" dirty="0" err="1">
+              <a:t>	$(CC) $(CFLAGS) -o hello main.cpp</a:t>
+            </a:r>
+          </a:p>
+          <a:p>
+            <a:endParaRPr lang="en-US" sz="1200" dirty="0">
+              <a:solidFill>
+                <a:srgbClr val="7030A0"/>
+              </a:solidFill>
+              <a:latin typeface="Consolas" panose="020B0609020204030204" pitchFamily="49" charset="0"/>
+              <a:cs typeface="Consolas" panose="020B0609020204030204" pitchFamily="49" charset="0"/>
+            </a:endParaRPr>
+          </a:p>
+          <a:p>
+            <a:r>
+              <a:rPr lang="en-US" sz="1200" dirty="0">
                 <a:solidFill>
                   <a:srgbClr val="7030A0"/>
                 </a:solidFill>
                 <a:latin typeface="Consolas" panose="020B0609020204030204" pitchFamily="49" charset="0"/>
                 <a:cs typeface="Consolas" panose="020B0609020204030204" pitchFamily="49" charset="0"/>
               </a:rPr>
-              <a:t>rm</a:t>
-            </a:r>
+              <a:t>clean:</a:t>
+            </a:r>
+          </a:p>
+          <a:p>
             <a:r>
               <a:rPr lang="en-US" sz="1200" dirty="0">
                 <a:solidFill>
@@ -4777,8 +4772,35 @@
                 <a:latin typeface="Consolas" panose="020B0609020204030204" pitchFamily="49" charset="0"/>
                 <a:cs typeface="Consolas" panose="020B0609020204030204" pitchFamily="49" charset="0"/>
               </a:rPr>
+              <a:t>	</a:t>
+            </a:r>
+            <a:r>
+              <a:rPr lang="en-US" sz="1200" dirty="0" err="1">
+                <a:solidFill>
+                  <a:srgbClr val="7030A0"/>
+                </a:solidFill>
+                <a:latin typeface="Consolas" panose="020B0609020204030204" pitchFamily="49" charset="0"/>
+                <a:cs typeface="Consolas" panose="020B0609020204030204" pitchFamily="49" charset="0"/>
+              </a:rPr>
+              <a:t>rm</a:t>
+            </a:r>
+            <a:r>
+              <a:rPr lang="en-US" sz="1200" dirty="0">
+                <a:solidFill>
+                  <a:srgbClr val="7030A0"/>
+                </a:solidFill>
+                <a:latin typeface="Consolas" panose="020B0609020204030204" pitchFamily="49" charset="0"/>
+                <a:cs typeface="Consolas" panose="020B0609020204030204" pitchFamily="49" charset="0"/>
+              </a:rPr>
               <a:t> -f hello</a:t>
             </a:r>
+            <a:endParaRPr lang="en-US" sz="1200" dirty="0">
+              <a:solidFill>
+                <a:srgbClr val="7030A0"/>
+              </a:solidFill>
+              <a:latin typeface="Consolas" panose="020B0609020204030204" pitchFamily="49" charset="0"/>
+              <a:cs typeface="Consolas" panose="020B0609020204030204" pitchFamily="49" charset="0"/>
+            </a:endParaRPr>
           </a:p>
         </p:txBody>
       </p:sp>
@@ -5128,11 +5150,7 @@
           <a:p>
             <a:r>
               <a:rPr lang="en-US" dirty="0" smtClean="0"/>
-              <a:t>To </a:t>
-            </a:r>
-            <a:r>
-              <a:rPr lang="en-US" dirty="0" smtClean="0"/>
-              <a:t>make life easier you can use the following </a:t>
+              <a:t>To make life easier you can use the following </a:t>
             </a:r>
             <a:r>
               <a:rPr lang="en-US" dirty="0" err="1" smtClean="0"/>
@@ -5238,8 +5256,8 @@
         </p:nvSpPr>
         <p:spPr>
           <a:xfrm>
-            <a:off x="1247959" y="2865958"/>
-            <a:ext cx="7236276" cy="2677656"/>
+            <a:off x="132323" y="2874049"/>
+            <a:ext cx="8879354" cy="2462213"/>
           </a:xfrm>
           <a:prstGeom prst="rect">
             <a:avLst/>
@@ -5253,7 +5271,7 @@
           <a:lstStyle/>
           <a:p>
             <a:r>
-              <a:rPr lang="en-US" sz="1200" dirty="0">
+              <a:rPr lang="en-US" sz="1100" dirty="0">
                 <a:solidFill>
                   <a:srgbClr val="7030A0"/>
                 </a:solidFill>
@@ -5265,7 +5283,7 @@
           </a:p>
           <a:p>
             <a:r>
-              <a:rPr lang="en-US" sz="1200" dirty="0">
+              <a:rPr lang="en-US" sz="1100" dirty="0">
                 <a:solidFill>
                   <a:srgbClr val="7030A0"/>
                 </a:solidFill>
@@ -5275,17 +5293,17 @@
               <a:t>BINPATH=/home/</a:t>
             </a:r>
             <a:r>
-              <a:rPr lang="en-US" sz="1200" dirty="0" err="1">
+              <a:rPr lang="en-US" sz="1100" dirty="0" err="1">
                 <a:solidFill>
                   <a:srgbClr val="7030A0"/>
                 </a:solidFill>
                 <a:latin typeface="Consolas" panose="020B0609020204030204" pitchFamily="49" charset="0"/>
                 <a:cs typeface="Consolas" panose="020B0609020204030204" pitchFamily="49" charset="0"/>
               </a:rPr>
-              <a:t>nico</a:t>
-            </a:r>
-            <a:r>
-              <a:rPr lang="en-US" sz="1200" dirty="0">
+              <a:t>bioboost</a:t>
+            </a:r>
+            <a:r>
+              <a:rPr lang="en-US" sz="1100" dirty="0">
                 <a:solidFill>
                   <a:srgbClr val="7030A0"/>
                 </a:solidFill>
@@ -5295,57 +5313,57 @@
               <a:t>/</a:t>
             </a:r>
             <a:r>
-              <a:rPr lang="en-US" sz="1200" dirty="0" err="1">
+              <a:rPr lang="en-US" sz="1100" dirty="0" err="1">
                 <a:solidFill>
                   <a:srgbClr val="7030A0"/>
                 </a:solidFill>
                 <a:latin typeface="Consolas" panose="020B0609020204030204" pitchFamily="49" charset="0"/>
                 <a:cs typeface="Consolas" panose="020B0609020204030204" pitchFamily="49" charset="0"/>
               </a:rPr>
-              <a:t>buildroot</a:t>
-            </a:r>
-            <a:r>
-              <a:rPr lang="en-US" sz="1200" dirty="0">
+              <a:t>rpi_tools</a:t>
+            </a:r>
+            <a:r>
+              <a:rPr lang="en-US" sz="1100" dirty="0">
                 <a:solidFill>
                   <a:srgbClr val="7030A0"/>
                 </a:solidFill>
                 <a:latin typeface="Consolas" panose="020B0609020204030204" pitchFamily="49" charset="0"/>
                 <a:cs typeface="Consolas" panose="020B0609020204030204" pitchFamily="49" charset="0"/>
               </a:rPr>
-              <a:t>/output/host/</a:t>
-            </a:r>
-            <a:r>
-              <a:rPr lang="en-US" sz="1200" dirty="0" err="1">
+              <a:t>/arm-bcm2708/gcc-linaro-arm-linux-gnueabihf-raspbian-x64/bin/arm-</a:t>
+            </a:r>
+            <a:r>
+              <a:rPr lang="en-US" sz="1100" dirty="0" err="1">
                 <a:solidFill>
                   <a:srgbClr val="7030A0"/>
                 </a:solidFill>
                 <a:latin typeface="Consolas" panose="020B0609020204030204" pitchFamily="49" charset="0"/>
                 <a:cs typeface="Consolas" panose="020B0609020204030204" pitchFamily="49" charset="0"/>
               </a:rPr>
-              <a:t>usr</a:t>
-            </a:r>
-            <a:r>
-              <a:rPr lang="en-US" sz="1200" dirty="0">
+              <a:t>linux</a:t>
+            </a:r>
+            <a:r>
+              <a:rPr lang="en-US" sz="1100" dirty="0">
                 <a:solidFill>
                   <a:srgbClr val="7030A0"/>
                 </a:solidFill>
                 <a:latin typeface="Consolas" panose="020B0609020204030204" pitchFamily="49" charset="0"/>
                 <a:cs typeface="Consolas" panose="020B0609020204030204" pitchFamily="49" charset="0"/>
               </a:rPr>
-              <a:t>/bin/arm-</a:t>
-            </a:r>
-            <a:r>
-              <a:rPr lang="en-US" sz="1200" dirty="0" err="1">
+              <a:t>-</a:t>
+            </a:r>
+            <a:r>
+              <a:rPr lang="en-US" sz="1100" dirty="0" err="1">
                 <a:solidFill>
                   <a:srgbClr val="7030A0"/>
                 </a:solidFill>
                 <a:latin typeface="Consolas" panose="020B0609020204030204" pitchFamily="49" charset="0"/>
                 <a:cs typeface="Consolas" panose="020B0609020204030204" pitchFamily="49" charset="0"/>
               </a:rPr>
-              <a:t>buildroot</a:t>
-            </a:r>
-            <a:r>
-              <a:rPr lang="en-US" sz="1200" dirty="0">
+              <a:t>gnueabihf</a:t>
+            </a:r>
+            <a:r>
+              <a:rPr lang="en-US" sz="1100" dirty="0">
                 <a:solidFill>
                   <a:srgbClr val="7030A0"/>
                 </a:solidFill>
@@ -5354,41 +5372,29 @@
               </a:rPr>
               <a:t>-</a:t>
             </a:r>
-            <a:r>
-              <a:rPr lang="en-US" sz="1200" dirty="0" err="1">
+          </a:p>
+          <a:p>
+            <a:r>
+              <a:rPr lang="en-US" sz="1100" dirty="0">
                 <a:solidFill>
                   <a:srgbClr val="7030A0"/>
                 </a:solidFill>
                 <a:latin typeface="Consolas" panose="020B0609020204030204" pitchFamily="49" charset="0"/>
                 <a:cs typeface="Consolas" panose="020B0609020204030204" pitchFamily="49" charset="0"/>
               </a:rPr>
-              <a:t>linux-uclibcgnueabi</a:t>
-            </a:r>
-            <a:r>
-              <a:rPr lang="en-US" sz="1200" dirty="0">
+              <a:t>CC=$(BINPATH)</a:t>
+            </a:r>
+            <a:r>
+              <a:rPr lang="en-US" sz="1100" dirty="0" err="1">
                 <a:solidFill>
                   <a:srgbClr val="7030A0"/>
                 </a:solidFill>
                 <a:latin typeface="Consolas" panose="020B0609020204030204" pitchFamily="49" charset="0"/>
                 <a:cs typeface="Consolas" panose="020B0609020204030204" pitchFamily="49" charset="0"/>
               </a:rPr>
-              <a:t>-</a:t>
-            </a:r>
-          </a:p>
-          <a:p>
-            <a:r>
-              <a:rPr lang="en-US" sz="1200" dirty="0">
-                <a:solidFill>
-                  <a:srgbClr val="7030A0"/>
-                </a:solidFill>
-                <a:latin typeface="Consolas" panose="020B0609020204030204" pitchFamily="49" charset="0"/>
-                <a:cs typeface="Consolas" panose="020B0609020204030204" pitchFamily="49" charset="0"/>
-              </a:rPr>
-              <a:t>CC=$(BINPATH)g++</a:t>
-            </a:r>
-          </a:p>
-          <a:p>
-            <a:endParaRPr lang="en-US" sz="1200" dirty="0">
+              <a:t>gcc</a:t>
+            </a:r>
+            <a:endParaRPr lang="en-US" sz="1100" dirty="0">
               <a:solidFill>
                 <a:srgbClr val="7030A0"/>
               </a:solidFill>
@@ -5397,43 +5403,7 @@
             </a:endParaRPr>
           </a:p>
           <a:p>
-            <a:r>
-              <a:rPr lang="en-US" sz="1200" dirty="0">
-                <a:solidFill>
-                  <a:srgbClr val="7030A0"/>
-                </a:solidFill>
-                <a:latin typeface="Consolas" panose="020B0609020204030204" pitchFamily="49" charset="0"/>
-                <a:cs typeface="Consolas" panose="020B0609020204030204" pitchFamily="49" charset="0"/>
-              </a:rPr>
-              <a:t># Compiler flags</a:t>
-            </a:r>
-          </a:p>
-          <a:p>
-            <a:r>
-              <a:rPr lang="en-US" sz="1200" dirty="0">
-                <a:solidFill>
-                  <a:srgbClr val="7030A0"/>
-                </a:solidFill>
-                <a:latin typeface="Consolas" panose="020B0609020204030204" pitchFamily="49" charset="0"/>
-                <a:cs typeface="Consolas" panose="020B0609020204030204" pitchFamily="49" charset="0"/>
-              </a:rPr>
-              <a:t>CFLAGS  = -Wall</a:t>
-            </a:r>
-          </a:p>
-          <a:p>
-            <a:r>
-              <a:rPr lang="en-US" sz="1200" dirty="0">
-                <a:solidFill>
-                  <a:srgbClr val="7030A0"/>
-                </a:solidFill>
-                <a:latin typeface="Consolas" panose="020B0609020204030204" pitchFamily="49" charset="0"/>
-                <a:cs typeface="Consolas" panose="020B0609020204030204" pitchFamily="49" charset="0"/>
-              </a:rPr>
-              <a:t>  #  -Wall turns on most, but not all, compiler warnings</a:t>
-            </a:r>
-          </a:p>
-          <a:p>
-            <a:endParaRPr lang="en-US" sz="1200" dirty="0">
+            <a:endParaRPr lang="en-US" sz="1100" dirty="0">
               <a:solidFill>
                 <a:srgbClr val="7030A0"/>
               </a:solidFill>
@@ -5442,7 +5412,43 @@
             </a:endParaRPr>
           </a:p>
           <a:p>
-            <a:endParaRPr lang="en-US" sz="1200" dirty="0">
+            <a:r>
+              <a:rPr lang="en-US" sz="1100" dirty="0">
+                <a:solidFill>
+                  <a:srgbClr val="7030A0"/>
+                </a:solidFill>
+                <a:latin typeface="Consolas" panose="020B0609020204030204" pitchFamily="49" charset="0"/>
+                <a:cs typeface="Consolas" panose="020B0609020204030204" pitchFamily="49" charset="0"/>
+              </a:rPr>
+              <a:t># Compiler flags</a:t>
+            </a:r>
+          </a:p>
+          <a:p>
+            <a:r>
+              <a:rPr lang="en-US" sz="1100" dirty="0">
+                <a:solidFill>
+                  <a:srgbClr val="7030A0"/>
+                </a:solidFill>
+                <a:latin typeface="Consolas" panose="020B0609020204030204" pitchFamily="49" charset="0"/>
+                <a:cs typeface="Consolas" panose="020B0609020204030204" pitchFamily="49" charset="0"/>
+              </a:rPr>
+              <a:t>CFLAGS=-Wall</a:t>
+            </a:r>
+          </a:p>
+          <a:p>
+            <a:r>
+              <a:rPr lang="en-US" sz="1100" dirty="0">
+                <a:solidFill>
+                  <a:srgbClr val="7030A0"/>
+                </a:solidFill>
+                <a:latin typeface="Consolas" panose="020B0609020204030204" pitchFamily="49" charset="0"/>
+                <a:cs typeface="Consolas" panose="020B0609020204030204" pitchFamily="49" charset="0"/>
+              </a:rPr>
+              <a:t>  #  -Wall turns on most, but not all, compiler warnings</a:t>
+            </a:r>
+          </a:p>
+          <a:p>
+            <a:endParaRPr lang="en-US" sz="1100" dirty="0">
               <a:solidFill>
                 <a:srgbClr val="7030A0"/>
               </a:solidFill>
@@ -5451,31 +5457,7 @@
             </a:endParaRPr>
           </a:p>
           <a:p>
-            <a:r>
-              <a:rPr lang="en-US" sz="1200" dirty="0">
-                <a:solidFill>
-                  <a:srgbClr val="7030A0"/>
-                </a:solidFill>
-                <a:latin typeface="Consolas" panose="020B0609020204030204" pitchFamily="49" charset="0"/>
-                <a:cs typeface="Consolas" panose="020B0609020204030204" pitchFamily="49" charset="0"/>
-              </a:rPr>
-              <a:t>hello: clean</a:t>
-            </a:r>
-          </a:p>
-          <a:p>
-            <a:r>
-              <a:rPr lang="en-US" sz="1200" dirty="0">
-                <a:solidFill>
-                  <a:srgbClr val="7030A0"/>
-                </a:solidFill>
-                <a:latin typeface="Consolas" panose="020B0609020204030204" pitchFamily="49" charset="0"/>
-                <a:cs typeface="Consolas" panose="020B0609020204030204" pitchFamily="49" charset="0"/>
-              </a:rPr>
-              <a:t>	$(CC) $(CFLAGS) -o hello main.cpp</a:t>
-            </a:r>
-          </a:p>
-          <a:p>
-            <a:endParaRPr lang="en-US" sz="1200" dirty="0">
+            <a:endParaRPr lang="en-US" sz="1100" dirty="0">
               <a:solidFill>
                 <a:srgbClr val="7030A0"/>
               </a:solidFill>
@@ -5485,47 +5467,87 @@
           </a:p>
           <a:p>
             <a:r>
-              <a:rPr lang="en-US" sz="1200" dirty="0">
+              <a:rPr lang="en-US" sz="1100" dirty="0">
                 <a:solidFill>
                   <a:srgbClr val="7030A0"/>
                 </a:solidFill>
                 <a:latin typeface="Consolas" panose="020B0609020204030204" pitchFamily="49" charset="0"/>
                 <a:cs typeface="Consolas" panose="020B0609020204030204" pitchFamily="49" charset="0"/>
               </a:rPr>
-              <a:t>clean:</a:t>
-            </a:r>
-          </a:p>
-          <a:p>
-            <a:r>
-              <a:rPr lang="en-US" sz="1200" dirty="0">
+              <a:t>hello: clean</a:t>
+            </a:r>
+          </a:p>
+          <a:p>
+            <a:r>
+              <a:rPr lang="en-US" sz="1100" dirty="0">
                 <a:solidFill>
                   <a:srgbClr val="7030A0"/>
                 </a:solidFill>
                 <a:latin typeface="Consolas" panose="020B0609020204030204" pitchFamily="49" charset="0"/>
                 <a:cs typeface="Consolas" panose="020B0609020204030204" pitchFamily="49" charset="0"/>
               </a:rPr>
-              <a:t>	</a:t>
-            </a:r>
-            <a:r>
-              <a:rPr lang="en-US" sz="1200" dirty="0" err="1">
+              <a:t>	$(CC) $(CFLAGS) -o hello main.cpp</a:t>
+            </a:r>
+          </a:p>
+          <a:p>
+            <a:endParaRPr lang="en-US" sz="1100" dirty="0">
+              <a:solidFill>
+                <a:srgbClr val="7030A0"/>
+              </a:solidFill>
+              <a:latin typeface="Consolas" panose="020B0609020204030204" pitchFamily="49" charset="0"/>
+              <a:cs typeface="Consolas" panose="020B0609020204030204" pitchFamily="49" charset="0"/>
+            </a:endParaRPr>
+          </a:p>
+          <a:p>
+            <a:r>
+              <a:rPr lang="en-US" sz="1100" dirty="0">
                 <a:solidFill>
                   <a:srgbClr val="7030A0"/>
                 </a:solidFill>
                 <a:latin typeface="Consolas" panose="020B0609020204030204" pitchFamily="49" charset="0"/>
                 <a:cs typeface="Consolas" panose="020B0609020204030204" pitchFamily="49" charset="0"/>
               </a:rPr>
-              <a:t>rm</a:t>
-            </a:r>
-            <a:r>
-              <a:rPr lang="en-US" sz="1200" dirty="0">
+              <a:t>clean:</a:t>
+            </a:r>
+          </a:p>
+          <a:p>
+            <a:r>
+              <a:rPr lang="en-US" sz="1100" dirty="0">
                 <a:solidFill>
                   <a:srgbClr val="7030A0"/>
                 </a:solidFill>
                 <a:latin typeface="Consolas" panose="020B0609020204030204" pitchFamily="49" charset="0"/>
                 <a:cs typeface="Consolas" panose="020B0609020204030204" pitchFamily="49" charset="0"/>
               </a:rPr>
+              <a:t>	</a:t>
+            </a:r>
+            <a:r>
+              <a:rPr lang="en-US" sz="1100" dirty="0" err="1">
+                <a:solidFill>
+                  <a:srgbClr val="7030A0"/>
+                </a:solidFill>
+                <a:latin typeface="Consolas" panose="020B0609020204030204" pitchFamily="49" charset="0"/>
+                <a:cs typeface="Consolas" panose="020B0609020204030204" pitchFamily="49" charset="0"/>
+              </a:rPr>
+              <a:t>rm</a:t>
+            </a:r>
+            <a:r>
+              <a:rPr lang="en-US" sz="1100" dirty="0">
+                <a:solidFill>
+                  <a:srgbClr val="7030A0"/>
+                </a:solidFill>
+                <a:latin typeface="Consolas" panose="020B0609020204030204" pitchFamily="49" charset="0"/>
+                <a:cs typeface="Consolas" panose="020B0609020204030204" pitchFamily="49" charset="0"/>
+              </a:rPr>
               <a:t> -f hello</a:t>
             </a:r>
+            <a:endParaRPr lang="en-US" sz="1100" dirty="0">
+              <a:solidFill>
+                <a:srgbClr val="7030A0"/>
+              </a:solidFill>
+              <a:latin typeface="Consolas" panose="020B0609020204030204" pitchFamily="49" charset="0"/>
+              <a:cs typeface="Consolas" panose="020B0609020204030204" pitchFamily="49" charset="0"/>
+            </a:endParaRPr>
           </a:p>
         </p:txBody>
       </p:sp>
@@ -5583,34 +5605,33 @@
           <a:p>
             <a:r>
               <a:rPr lang="en-US" dirty="0"/>
-              <a:t>Raspberry Pi Basic I2C Memory </a:t>
+              <a:t>Cross-compiling Code for the Raspberry Pi 2</a:t>
+            </a:r>
+          </a:p>
+        </p:txBody>
+      </p:sp>
+      <p:sp>
+        <p:nvSpPr>
+          <p:cNvPr id="5" name="Subtitle 4"/>
+          <p:cNvSpPr>
+            <a:spLocks noGrp="1"/>
+          </p:cNvSpPr>
+          <p:nvPr>
+            <p:ph type="subTitle" idx="1"/>
+          </p:nvPr>
+        </p:nvSpPr>
+        <p:spPr/>
+        <p:txBody>
+          <a:bodyPr/>
+          <a:lstStyle/>
+          <a:p>
+            <a:r>
+              <a:rPr lang="en-US" dirty="0"/>
+              <a:t>Transferring Files </a:t>
             </a:r>
             <a:r>
               <a:rPr lang="en-US" dirty="0" smtClean="0"/>
-              <a:t>Master</a:t>
-            </a:r>
-            <a:endParaRPr lang="en-US" dirty="0"/>
-          </a:p>
-        </p:txBody>
-      </p:sp>
-      <p:sp>
-        <p:nvSpPr>
-          <p:cNvPr id="5" name="Subtitle 4"/>
-          <p:cNvSpPr>
-            <a:spLocks noGrp="1"/>
-          </p:cNvSpPr>
-          <p:nvPr>
-            <p:ph type="subTitle" idx="1"/>
-          </p:nvPr>
-        </p:nvSpPr>
-        <p:spPr/>
-        <p:txBody>
-          <a:bodyPr/>
-          <a:lstStyle/>
-          <a:p>
-            <a:r>
-              <a:rPr lang="en-US" dirty="0" smtClean="0"/>
-              <a:t>Secure Copy</a:t>
+              <a:t>to the Raspberry Pi</a:t>
             </a:r>
             <a:endParaRPr lang="en-US" dirty="0"/>
           </a:p>
@@ -5619,20 +5640,13 @@
     </p:spTree>
     <p:extLst>
       <p:ext uri="{BB962C8B-B14F-4D97-AF65-F5344CB8AC3E}">
-        <p14:creationId xmlns:p14="http://schemas.microsoft.com/office/powerpoint/2010/main" val="2920237524"/>
+        <p14:creationId xmlns:p14="http://schemas.microsoft.com/office/powerpoint/2010/main" val="3152586350"/>
       </p:ext>
     </p:extLst>
   </p:cSld>
   <p:clrMapOvr>
     <a:masterClrMapping/>
   </p:clrMapOvr>
-  <p:timing>
-    <p:tnLst>
-      <p:par>
-        <p:cTn id="1" dur="indefinite" restart="never" nodeType="tmRoot"/>
-      </p:par>
-    </p:tnLst>
-  </p:timing>
 </p:sld>
 </file>
 
@@ -5660,74 +5674,6 @@
             <a:spLocks noGrp="1"/>
           </p:cNvSpPr>
           <p:nvPr>
-            <p:ph type="ctrTitle"/>
-          </p:nvPr>
-        </p:nvSpPr>
-        <p:spPr/>
-        <p:txBody>
-          <a:bodyPr/>
-          <a:lstStyle/>
-          <a:p>
-            <a:endParaRPr lang="en-US"/>
-          </a:p>
-        </p:txBody>
-      </p:sp>
-      <p:sp>
-        <p:nvSpPr>
-          <p:cNvPr id="5" name="Subtitle 4"/>
-          <p:cNvSpPr>
-            <a:spLocks noGrp="1"/>
-          </p:cNvSpPr>
-          <p:nvPr>
-            <p:ph type="subTitle" idx="1"/>
-          </p:nvPr>
-        </p:nvSpPr>
-        <p:spPr/>
-        <p:txBody>
-          <a:bodyPr/>
-          <a:lstStyle/>
-          <a:p>
-            <a:endParaRPr lang="en-US"/>
-          </a:p>
-        </p:txBody>
-      </p:sp>
-    </p:spTree>
-    <p:extLst>
-      <p:ext uri="{BB962C8B-B14F-4D97-AF65-F5344CB8AC3E}">
-        <p14:creationId xmlns:p14="http://schemas.microsoft.com/office/powerpoint/2010/main" val="1452146231"/>
-      </p:ext>
-    </p:extLst>
-  </p:cSld>
-  <p:clrMapOvr>
-    <a:masterClrMapping/>
-  </p:clrMapOvr>
-</p:sld>
-</file>
-
-<file path=ppt/slides/slide15.xml><?xml version="1.0" encoding="utf-8"?>
-<p:sld xmlns:a="http://schemas.openxmlformats.org/drawingml/2006/main" xmlns:r="http://schemas.openxmlformats.org/officeDocument/2006/relationships" xmlns:p="http://schemas.openxmlformats.org/presentationml/2006/main">
-  <p:cSld>
-    <p:spTree>
-      <p:nvGrpSpPr>
-        <p:cNvPr id="1" name=""/>
-        <p:cNvGrpSpPr/>
-        <p:nvPr/>
-      </p:nvGrpSpPr>
-      <p:grpSpPr>
-        <a:xfrm>
-          <a:off x="0" y="0"/>
-          <a:ext cx="0" cy="0"/>
-          <a:chOff x="0" y="0"/>
-          <a:chExt cx="0" cy="0"/>
-        </a:xfrm>
-      </p:grpSpPr>
-      <p:sp>
-        <p:nvSpPr>
-          <p:cNvPr id="4" name="Title 3"/>
-          <p:cNvSpPr>
-            <a:spLocks noGrp="1"/>
-          </p:cNvSpPr>
-          <p:nvPr>
             <p:ph type="title"/>
           </p:nvPr>
         </p:nvSpPr>
@@ -5761,7 +5707,15 @@
           <a:p>
             <a:r>
               <a:rPr lang="en-US" dirty="0" smtClean="0"/>
-              <a:t>To files from one system to another (local or remote) we can use the secure copy tool which has the following syntax</a:t>
+              <a:t>To </a:t>
+            </a:r>
+            <a:r>
+              <a:rPr lang="en-US" dirty="0" smtClean="0"/>
+              <a:t>transfer files </a:t>
+            </a:r>
+            <a:r>
+              <a:rPr lang="en-US" dirty="0" smtClean="0"/>
+              <a:t>from one system to another (local or remote) we can use the secure copy tool which has the following syntax</a:t>
             </a:r>
           </a:p>
           <a:p>
@@ -5888,8 +5842,8 @@
         </p:nvSpPr>
         <p:spPr>
           <a:xfrm>
-            <a:off x="1403059" y="5086890"/>
-            <a:ext cx="6337882" cy="646331"/>
+            <a:off x="1195143" y="5086890"/>
+            <a:ext cx="6753713" cy="369332"/>
           </a:xfrm>
           <a:prstGeom prst="rect">
             <a:avLst/>
@@ -5963,7 +5917,17 @@
                 <a:latin typeface="Consolas" panose="020B0609020204030204" pitchFamily="49" charset="0"/>
                 <a:cs typeface="Consolas" panose="020B0609020204030204" pitchFamily="49" charset="0"/>
               </a:rPr>
-              <a:t>hello_world.txt root@172.180.35.10:/</a:t>
+              <a:t>hello </a:t>
+            </a:r>
+            <a:r>
+              <a:rPr lang="en-US" dirty="0" smtClean="0">
+                <a:solidFill>
+                  <a:srgbClr val="00B050"/>
+                </a:solidFill>
+                <a:latin typeface="Consolas" panose="020B0609020204030204" pitchFamily="49" charset="0"/>
+                <a:cs typeface="Consolas" panose="020B0609020204030204" pitchFamily="49" charset="0"/>
+              </a:rPr>
+              <a:t>root@172.180.35.10:/</a:t>
             </a:r>
             <a:endParaRPr lang="en-US" dirty="0">
               <a:solidFill>
@@ -5979,88 +5943,6 @@
     <p:extLst>
       <p:ext uri="{BB962C8B-B14F-4D97-AF65-F5344CB8AC3E}">
         <p14:creationId xmlns:p14="http://schemas.microsoft.com/office/powerpoint/2010/main" val="47007994"/>
-      </p:ext>
-    </p:extLst>
-  </p:cSld>
-  <p:clrMapOvr>
-    <a:masterClrMapping/>
-  </p:clrMapOvr>
-  <p:timing>
-    <p:tnLst>
-      <p:par>
-        <p:cTn id="1" dur="indefinite" restart="never" nodeType="tmRoot"/>
-      </p:par>
-    </p:tnLst>
-  </p:timing>
-</p:sld>
-</file>
-
-<file path=ppt/slides/slide16.xml><?xml version="1.0" encoding="utf-8"?>
-<p:sld xmlns:a="http://schemas.openxmlformats.org/drawingml/2006/main" xmlns:r="http://schemas.openxmlformats.org/officeDocument/2006/relationships" xmlns:p="http://schemas.openxmlformats.org/presentationml/2006/main">
-  <p:cSld>
-    <p:spTree>
-      <p:nvGrpSpPr>
-        <p:cNvPr id="1" name=""/>
-        <p:cNvGrpSpPr/>
-        <p:nvPr/>
-      </p:nvGrpSpPr>
-      <p:grpSpPr>
-        <a:xfrm>
-          <a:off x="0" y="0"/>
-          <a:ext cx="0" cy="0"/>
-          <a:chOff x="0" y="0"/>
-          <a:chExt cx="0" cy="0"/>
-        </a:xfrm>
-      </p:grpSpPr>
-      <p:sp>
-        <p:nvSpPr>
-          <p:cNvPr id="4" name="Title 3"/>
-          <p:cNvSpPr>
-            <a:spLocks noGrp="1"/>
-          </p:cNvSpPr>
-          <p:nvPr>
-            <p:ph type="ctrTitle"/>
-          </p:nvPr>
-        </p:nvSpPr>
-        <p:spPr/>
-        <p:txBody>
-          <a:bodyPr/>
-          <a:lstStyle/>
-          <a:p>
-            <a:r>
-              <a:rPr lang="en-US" dirty="0"/>
-              <a:t>Raspberry Pi Basic I2C Memory Master</a:t>
-            </a:r>
-          </a:p>
-        </p:txBody>
-      </p:sp>
-      <p:sp>
-        <p:nvSpPr>
-          <p:cNvPr id="5" name="Subtitle 4"/>
-          <p:cNvSpPr>
-            <a:spLocks noGrp="1"/>
-          </p:cNvSpPr>
-          <p:nvPr>
-            <p:ph type="subTitle" idx="1"/>
-          </p:nvPr>
-        </p:nvSpPr>
-        <p:spPr/>
-        <p:txBody>
-          <a:bodyPr/>
-          <a:lstStyle/>
-          <a:p>
-            <a:r>
-              <a:rPr lang="en-US" dirty="0" smtClean="0"/>
-              <a:t>Assignment</a:t>
-            </a:r>
-            <a:endParaRPr lang="en-US" dirty="0"/>
-          </a:p>
-        </p:txBody>
-      </p:sp>
-    </p:spTree>
-    <p:extLst>
-      <p:ext uri="{BB962C8B-B14F-4D97-AF65-F5344CB8AC3E}">
-        <p14:creationId xmlns:p14="http://schemas.microsoft.com/office/powerpoint/2010/main" val="3357661674"/>
       </p:ext>
     </p:extLst>
   </p:cSld>
@@ -6218,7 +6100,19 @@
           <a:p>
             <a:r>
               <a:rPr lang="en-US" dirty="0"/>
-              <a:t>A native compiler such as the default </a:t>
+              <a:t>A </a:t>
+            </a:r>
+            <a:r>
+              <a:rPr lang="en-US" dirty="0">
+                <a:solidFill>
+                  <a:srgbClr val="0070C0"/>
+                </a:solidFill>
+              </a:rPr>
+              <a:t>native compiler </a:t>
+            </a:r>
+            <a:r>
+              <a:rPr lang="en-US" dirty="0"/>
+              <a:t>such as the default </a:t>
             </a:r>
             <a:r>
               <a:rPr lang="en-US" dirty="0" err="1"/>
@@ -6241,7 +6135,19 @@
             </a:r>
             <a:r>
               <a:rPr lang="en-US" dirty="0"/>
-              <a:t>creates binaries for the same type of machine that it runs </a:t>
+              <a:t>creates binaries for the </a:t>
+            </a:r>
+            <a:r>
+              <a:rPr lang="en-US" dirty="0">
+                <a:solidFill>
+                  <a:srgbClr val="0070C0"/>
+                </a:solidFill>
+              </a:rPr>
+              <a:t>same type of machine </a:t>
+            </a:r>
+            <a:r>
+              <a:rPr lang="en-US" dirty="0"/>
+              <a:t>that it runs </a:t>
             </a:r>
             <a:r>
               <a:rPr lang="en-US" dirty="0" smtClean="0"/>
@@ -6284,7 +6190,19 @@
           <a:p>
             <a:r>
               <a:rPr lang="en-US" dirty="0"/>
-              <a:t>A cross compiler such as the "arm-</a:t>
+              <a:t>A </a:t>
+            </a:r>
+            <a:r>
+              <a:rPr lang="en-US" dirty="0">
+                <a:solidFill>
+                  <a:srgbClr val="0070C0"/>
+                </a:solidFill>
+              </a:rPr>
+              <a:t>cross compiler </a:t>
+            </a:r>
+            <a:r>
+              <a:rPr lang="en-US" dirty="0"/>
+              <a:t>such as the "arm-</a:t>
             </a:r>
             <a:r>
               <a:rPr lang="en-US" dirty="0" err="1"/>

</xml_diff>